<commit_message>
Added a lot of extra information to assist porting and updated WACK version notes
</commit_message>
<xml_diff>
--- a/PortingUnity_Win8.pptx
+++ b/PortingUnity_Win8.pptx
@@ -9,11 +9,15 @@
     <p:sldId id="258" r:id="rId3"/>
     <p:sldId id="257" r:id="rId4"/>
     <p:sldId id="260" r:id="rId5"/>
-    <p:sldId id="259" r:id="rId6"/>
-    <p:sldId id="262" r:id="rId7"/>
-    <p:sldId id="261" r:id="rId8"/>
-    <p:sldId id="263" r:id="rId9"/>
-    <p:sldId id="264" r:id="rId10"/>
+    <p:sldId id="269" r:id="rId6"/>
+    <p:sldId id="268" r:id="rId7"/>
+    <p:sldId id="265" r:id="rId8"/>
+    <p:sldId id="259" r:id="rId9"/>
+    <p:sldId id="262" r:id="rId10"/>
+    <p:sldId id="261" r:id="rId11"/>
+    <p:sldId id="263" r:id="rId12"/>
+    <p:sldId id="267" r:id="rId13"/>
+    <p:sldId id="264" r:id="rId14"/>
   </p:sldIdLst>
   <p:sldSz cx="12192000" cy="6858000"/>
   <p:notesSz cx="6858000" cy="9144000"/>
@@ -112,7 +116,52 @@
       </a:defRPr>
     </a:lvl9pPr>
   </p:defaultTextStyle>
+  <p:extLst>
+    <p:ext uri="{EFAFB233-063F-42B5-8137-9DF3F51BA10A}">
+      <p15:sldGuideLst xmlns:p15="http://schemas.microsoft.com/office/powerpoint/2012/main"/>
+    </p:ext>
+  </p:extLst>
 </p:presentation>
+</file>
+
+<file path=ppt/ink/ink1.xml><?xml version="1.0" encoding="utf-8"?>
+<inkml:ink xmlns:inkml="http://www.w3.org/2003/InkML">
+  <inkml:definitions>
+    <inkml:context xml:id="ctx0">
+      <inkml:inkSource xml:id="inkSrc0">
+        <inkml:traceFormat>
+          <inkml:channel name="X" type="integer" max="23472" units="cm"/>
+          <inkml:channel name="Y" type="integer" max="13203" units="cm"/>
+          <inkml:channel name="F" type="integer" max="1023" units="dev"/>
+          <inkml:channel name="T" type="integer" max="2.14748E9" units="dev"/>
+        </inkml:traceFormat>
+        <inkml:channelProperties>
+          <inkml:channelProperty channel="X" name="resolution" value="1000.08521" units="1/cm"/>
+          <inkml:channelProperty channel="Y" name="resolution" value="1000.22729" units="1/cm"/>
+          <inkml:channelProperty channel="F" name="resolution" value="0" units="1/dev"/>
+          <inkml:channelProperty channel="T" name="resolution" value="1" units="1/dev"/>
+        </inkml:channelProperties>
+      </inkml:inkSource>
+      <inkml:timestamp xml:id="ts0" timeString="2014-05-02T21:41:48.481"/>
+    </inkml:context>
+    <inkml:brush xml:id="br0">
+      <inkml:brushProperty name="width" value="0.08333" units="cm"/>
+      <inkml:brushProperty name="height" value="0.08333" units="cm"/>
+      <inkml:brushProperty name="color" value="#ED1C24"/>
+      <inkml:brushProperty name="fitToCurve" value="1"/>
+    </inkml:brush>
+  </inkml:definitions>
+  <inkml:traceGroup>
+    <inkml:annotationXML>
+      <emma:emma xmlns:emma="http://www.w3.org/2003/04/emma" version="1.0">
+        <emma:interpretation id="{25AE5032-96F4-4DC3-AE19-5F05306FBB91}" emma:medium="tactile" emma:mode="ink">
+          <msink:context xmlns:msink="http://schemas.microsoft.com/ink/2010/main" type="inkDrawing" rotatedBoundingBox="3009,12678 12085,12450 12158,15350 3082,15578" hotPoints="12320,14167 7944,15465 3664,13880 8040,12581" semanticType="enclosure" shapeName="Ellipse"/>
+        </emma:interpretation>
+      </emma:emma>
+    </inkml:annotationXML>
+    <inkml:trace contextRef="#ctx0" brushRef="#br0">976 2221 9 0,'-4'36'86'16,"4"-36"0"-16,44 26-4 16,-2-8-60-16,10-10-6 15,26 12 4-15,3-4-1 16,23 8 5-16,8-6-2 16,14 12 2-16,6-4-2 0,18 6 1 15,18-6-3 1,25 10-1-16,23-6-2 15,26 4-1-15,30 2-4 16,31 6-4-16,25 0 1 0,19 0-6 16,17-8 3-16,0-6-6 15,1-6 3-15,1-8-4 16,-13-16 7-16,-9-14 0 16,-10-18 1-16,-13-4 4 15,-13-18-4-15,-8-8 3 16,-17-14-3-16,-17-10-1 15,-20-8-2-15,-22-4-2 16,-31-6 0-16,-29-2-4 0,-28 1 2 16,-38-3 3-1,-38-2-4-15,-42 0 2 16,-44-4-2-16,-36-4 0 0,-44 0-2 16,-32-6 1-16,-34 1-4 15,-21-3-5-15,-19 8 4 16,-16 4-1-16,-4 12-1 15,-11 8 1-15,-7 12 0 16,-18 8 2-16,-16 14 0 16,-23 10 4-16,-21 9-2 15,-25 7 1-15,-25 6 2 16,-12 4-2-16,-3 8 0 0,-5 2-3 16,15 10-1-16,13 10-1 15,15 14 0 1,21 14 1-16,16 20-1 0,9 21 2 15,1 27 2-15,4 24 5 16,9 22 0-16,13 16 6 16,24 6-3-16,30 4 8 15,43-5-1-15,55-1-3 16,66-10 4-16,72-12-3 16,78-14 2-16,70-4-5 15,75-11 4-15,65-3-9 16,54-16 5-16,63 0 2 15,57-14-3-15,41-12 2 16,92-12-7-16,-27-2-9 16,19-4-22-16,-10-16-79 15,77-2-7-15,-103-18-5 16,-43-14-7-16</inkml:trace>
+  </inkml:traceGroup>
+</inkml:ink>
 </file>
 
 <file path=ppt/slideLayouts/slideLayout1.xml><?xml version="1.0" encoding="utf-8"?>
@@ -246,7 +295,7 @@
           <a:p>
             <a:fld id="{EB741852-085B-4304-A0BB-F6C62D9D1BEF}" type="datetimeFigureOut">
               <a:rPr lang="en-AU" smtClean="0"/>
-              <a:t>19/03/2014</a:t>
+              <a:t>3/05/2014</a:t>
             </a:fld>
             <a:endParaRPr lang="en-AU"/>
           </a:p>
@@ -416,7 +465,7 @@
           <a:p>
             <a:fld id="{EB741852-085B-4304-A0BB-F6C62D9D1BEF}" type="datetimeFigureOut">
               <a:rPr lang="en-AU" smtClean="0"/>
-              <a:t>19/03/2014</a:t>
+              <a:t>3/05/2014</a:t>
             </a:fld>
             <a:endParaRPr lang="en-AU"/>
           </a:p>
@@ -596,7 +645,7 @@
           <a:p>
             <a:fld id="{EB741852-085B-4304-A0BB-F6C62D9D1BEF}" type="datetimeFigureOut">
               <a:rPr lang="en-AU" smtClean="0"/>
-              <a:t>19/03/2014</a:t>
+              <a:t>3/05/2014</a:t>
             </a:fld>
             <a:endParaRPr lang="en-AU"/>
           </a:p>
@@ -766,7 +815,7 @@
           <a:p>
             <a:fld id="{EB741852-085B-4304-A0BB-F6C62D9D1BEF}" type="datetimeFigureOut">
               <a:rPr lang="en-AU" smtClean="0"/>
-              <a:t>19/03/2014</a:t>
+              <a:t>3/05/2014</a:t>
             </a:fld>
             <a:endParaRPr lang="en-AU"/>
           </a:p>
@@ -1012,7 +1061,7 @@
           <a:p>
             <a:fld id="{EB741852-085B-4304-A0BB-F6C62D9D1BEF}" type="datetimeFigureOut">
               <a:rPr lang="en-AU" smtClean="0"/>
-              <a:t>19/03/2014</a:t>
+              <a:t>3/05/2014</a:t>
             </a:fld>
             <a:endParaRPr lang="en-AU"/>
           </a:p>
@@ -1244,7 +1293,7 @@
           <a:p>
             <a:fld id="{EB741852-085B-4304-A0BB-F6C62D9D1BEF}" type="datetimeFigureOut">
               <a:rPr lang="en-AU" smtClean="0"/>
-              <a:t>19/03/2014</a:t>
+              <a:t>3/05/2014</a:t>
             </a:fld>
             <a:endParaRPr lang="en-AU"/>
           </a:p>
@@ -1611,7 +1660,7 @@
           <a:p>
             <a:fld id="{EB741852-085B-4304-A0BB-F6C62D9D1BEF}" type="datetimeFigureOut">
               <a:rPr lang="en-AU" smtClean="0"/>
-              <a:t>19/03/2014</a:t>
+              <a:t>3/05/2014</a:t>
             </a:fld>
             <a:endParaRPr lang="en-AU"/>
           </a:p>
@@ -1729,7 +1778,7 @@
           <a:p>
             <a:fld id="{EB741852-085B-4304-A0BB-F6C62D9D1BEF}" type="datetimeFigureOut">
               <a:rPr lang="en-AU" smtClean="0"/>
-              <a:t>19/03/2014</a:t>
+              <a:t>3/05/2014</a:t>
             </a:fld>
             <a:endParaRPr lang="en-AU"/>
           </a:p>
@@ -1824,7 +1873,7 @@
           <a:p>
             <a:fld id="{EB741852-085B-4304-A0BB-F6C62D9D1BEF}" type="datetimeFigureOut">
               <a:rPr lang="en-AU" smtClean="0"/>
-              <a:t>19/03/2014</a:t>
+              <a:t>3/05/2014</a:t>
             </a:fld>
             <a:endParaRPr lang="en-AU"/>
           </a:p>
@@ -2101,7 +2150,7 @@
           <a:p>
             <a:fld id="{EB741852-085B-4304-A0BB-F6C62D9D1BEF}" type="datetimeFigureOut">
               <a:rPr lang="en-AU" smtClean="0"/>
-              <a:t>19/03/2014</a:t>
+              <a:t>3/05/2014</a:t>
             </a:fld>
             <a:endParaRPr lang="en-AU"/>
           </a:p>
@@ -2354,7 +2403,7 @@
           <a:p>
             <a:fld id="{EB741852-085B-4304-A0BB-F6C62D9D1BEF}" type="datetimeFigureOut">
               <a:rPr lang="en-AU" smtClean="0"/>
-              <a:t>19/03/2014</a:t>
+              <a:t>3/05/2014</a:t>
             </a:fld>
             <a:endParaRPr lang="en-AU"/>
           </a:p>
@@ -2567,7 +2616,7 @@
           <a:p>
             <a:fld id="{EB741852-085B-4304-A0BB-F6C62D9D1BEF}" type="datetimeFigureOut">
               <a:rPr lang="en-AU" smtClean="0"/>
-              <a:t>19/03/2014</a:t>
+              <a:t>3/05/2014</a:t>
             </a:fld>
             <a:endParaRPr lang="en-AU"/>
           </a:p>
@@ -3012,7 +3061,11 @@
           <a:p>
             <a:r>
               <a:rPr lang="en-AU" dirty="0" smtClean="0"/>
-              <a:t>In 4 Easy Steps</a:t>
+              <a:t>In 4 Easy </a:t>
+            </a:r>
+            <a:r>
+              <a:rPr lang="en-AU" dirty="0" smtClean="0"/>
+              <a:t>Steps</a:t>
             </a:r>
           </a:p>
           <a:p>
@@ -3031,6 +3084,546 @@
     <p:extLst>
       <p:ext uri="{BB962C8B-B14F-4D97-AF65-F5344CB8AC3E}">
         <p14:creationId xmlns:p14="http://schemas.microsoft.com/office/powerpoint/2010/main" val="1142713171"/>
+      </p:ext>
+    </p:extLst>
+  </p:cSld>
+  <p:clrMapOvr>
+    <a:masterClrMapping/>
+  </p:clrMapOvr>
+</p:sld>
+</file>
+
+<file path=ppt/slides/slide10.xml><?xml version="1.0" encoding="utf-8"?>
+<p:sld xmlns:a="http://schemas.openxmlformats.org/drawingml/2006/main" xmlns:r="http://schemas.openxmlformats.org/officeDocument/2006/relationships" xmlns:p="http://schemas.openxmlformats.org/presentationml/2006/main">
+  <p:cSld>
+    <p:spTree>
+      <p:nvGrpSpPr>
+        <p:cNvPr id="1" name=""/>
+        <p:cNvGrpSpPr/>
+        <p:nvPr/>
+      </p:nvGrpSpPr>
+      <p:grpSpPr>
+        <a:xfrm>
+          <a:off x="0" y="0"/>
+          <a:ext cx="0" cy="0"/>
+          <a:chOff x="0" y="0"/>
+          <a:chExt cx="0" cy="0"/>
+        </a:xfrm>
+      </p:grpSpPr>
+      <p:sp>
+        <p:nvSpPr>
+          <p:cNvPr id="2" name="Title 1"/>
+          <p:cNvSpPr>
+            <a:spLocks noGrp="1"/>
+          </p:cNvSpPr>
+          <p:nvPr>
+            <p:ph type="title"/>
+          </p:nvPr>
+        </p:nvSpPr>
+        <p:spPr/>
+        <p:txBody>
+          <a:bodyPr/>
+          <a:lstStyle/>
+          <a:p>
+            <a:r>
+              <a:rPr lang="en-AU" dirty="0" smtClean="0"/>
+              <a:t>Step 4 – Windows 8 Features</a:t>
+            </a:r>
+            <a:endParaRPr lang="en-AU" dirty="0"/>
+          </a:p>
+        </p:txBody>
+      </p:sp>
+      <p:sp>
+        <p:nvSpPr>
+          <p:cNvPr id="5" name="Content Placeholder 4"/>
+          <p:cNvSpPr>
+            <a:spLocks noGrp="1"/>
+          </p:cNvSpPr>
+          <p:nvPr>
+            <p:ph idx="1"/>
+          </p:nvPr>
+        </p:nvSpPr>
+        <p:spPr/>
+        <p:txBody>
+          <a:bodyPr/>
+          <a:lstStyle/>
+          <a:p>
+            <a:r>
+              <a:rPr lang="en-AU" dirty="0" smtClean="0"/>
+              <a:t>Resizable screen (needs to be responsive)</a:t>
+            </a:r>
+          </a:p>
+          <a:p>
+            <a:pPr lvl="1"/>
+            <a:r>
+              <a:rPr lang="en-AU" dirty="0" smtClean="0"/>
+              <a:t>Choose from 320px or 500px minimum</a:t>
+            </a:r>
+          </a:p>
+          <a:p>
+            <a:r>
+              <a:rPr lang="en-AU" dirty="0" smtClean="0"/>
+              <a:t>Connect game to App Lifecycle (if required)</a:t>
+            </a:r>
+          </a:p>
+          <a:p>
+            <a:r>
+              <a:rPr lang="en-AU" dirty="0" smtClean="0"/>
+              <a:t>Live Tiles</a:t>
+            </a:r>
+          </a:p>
+          <a:p>
+            <a:r>
+              <a:rPr lang="en-AU" dirty="0" smtClean="0"/>
+              <a:t>Share Charm</a:t>
+            </a:r>
+          </a:p>
+          <a:p>
+            <a:r>
+              <a:rPr lang="en-AU" dirty="0" smtClean="0"/>
+              <a:t>Keyboard &amp; Mouse Support</a:t>
+            </a:r>
+          </a:p>
+          <a:p>
+            <a:r>
+              <a:rPr lang="en-AU" dirty="0" smtClean="0"/>
+              <a:t>Required Icon Assets (Small/Medium/Large tiles + Splash Screen)</a:t>
+            </a:r>
+          </a:p>
+        </p:txBody>
+      </p:sp>
+    </p:spTree>
+    <p:extLst>
+      <p:ext uri="{BB962C8B-B14F-4D97-AF65-F5344CB8AC3E}">
+        <p14:creationId xmlns:p14="http://schemas.microsoft.com/office/powerpoint/2010/main" val="3441485953"/>
+      </p:ext>
+    </p:extLst>
+  </p:cSld>
+  <p:clrMapOvr>
+    <a:masterClrMapping/>
+  </p:clrMapOvr>
+</p:sld>
+</file>
+
+<file path=ppt/slides/slide11.xml><?xml version="1.0" encoding="utf-8"?>
+<p:sld xmlns:a="http://schemas.openxmlformats.org/drawingml/2006/main" xmlns:r="http://schemas.openxmlformats.org/officeDocument/2006/relationships" xmlns:p="http://schemas.openxmlformats.org/presentationml/2006/main">
+  <p:cSld>
+    <p:spTree>
+      <p:nvGrpSpPr>
+        <p:cNvPr id="1" name=""/>
+        <p:cNvGrpSpPr/>
+        <p:nvPr/>
+      </p:nvGrpSpPr>
+      <p:grpSpPr>
+        <a:xfrm>
+          <a:off x="0" y="0"/>
+          <a:ext cx="0" cy="0"/>
+          <a:chOff x="0" y="0"/>
+          <a:chExt cx="0" cy="0"/>
+        </a:xfrm>
+      </p:grpSpPr>
+      <p:sp>
+        <p:nvSpPr>
+          <p:cNvPr id="2" name="Title 1"/>
+          <p:cNvSpPr>
+            <a:spLocks noGrp="1"/>
+          </p:cNvSpPr>
+          <p:nvPr>
+            <p:ph type="title"/>
+          </p:nvPr>
+        </p:nvSpPr>
+        <p:spPr/>
+        <p:txBody>
+          <a:bodyPr/>
+          <a:lstStyle/>
+          <a:p>
+            <a:r>
+              <a:rPr lang="en-AU" dirty="0" smtClean="0"/>
+              <a:t>Finishing Touches</a:t>
+            </a:r>
+            <a:endParaRPr lang="en-AU" dirty="0"/>
+          </a:p>
+        </p:txBody>
+      </p:sp>
+      <p:sp>
+        <p:nvSpPr>
+          <p:cNvPr id="3" name="Content Placeholder 2"/>
+          <p:cNvSpPr>
+            <a:spLocks noGrp="1"/>
+          </p:cNvSpPr>
+          <p:nvPr>
+            <p:ph idx="1"/>
+          </p:nvPr>
+        </p:nvSpPr>
+        <p:spPr/>
+        <p:txBody>
+          <a:bodyPr/>
+          <a:lstStyle/>
+          <a:p>
+            <a:r>
+              <a:rPr lang="en-AU" dirty="0" smtClean="0"/>
+              <a:t>Polish your game</a:t>
+            </a:r>
+          </a:p>
+          <a:p>
+            <a:pPr lvl="1"/>
+            <a:r>
+              <a:rPr lang="en-AU" dirty="0" smtClean="0"/>
+              <a:t>Fluid loading experience</a:t>
+            </a:r>
+          </a:p>
+          <a:p>
+            <a:pPr lvl="1"/>
+            <a:r>
+              <a:rPr lang="en-AU" dirty="0" smtClean="0"/>
+              <a:t>Gamepad support</a:t>
+            </a:r>
+          </a:p>
+          <a:p>
+            <a:r>
+              <a:rPr lang="en-AU" dirty="0" smtClean="0"/>
+              <a:t>Check your assets</a:t>
+            </a:r>
+          </a:p>
+          <a:p>
+            <a:pPr lvl="1"/>
+            <a:r>
+              <a:rPr lang="en-AU" dirty="0" smtClean="0"/>
+              <a:t>PVR textures will not work, convert to DXT</a:t>
+            </a:r>
+          </a:p>
+          <a:p>
+            <a:r>
+              <a:rPr lang="en-AU" dirty="0" smtClean="0"/>
+              <a:t>Check your Materials</a:t>
+            </a:r>
+          </a:p>
+          <a:p>
+            <a:pPr lvl="1"/>
+            <a:r>
+              <a:rPr lang="en-AU" dirty="0" smtClean="0"/>
+              <a:t>Defaults will work, custom may not, check for Direct3D</a:t>
+            </a:r>
+          </a:p>
+          <a:p>
+            <a:pPr lvl="1"/>
+            <a:r>
+              <a:rPr lang="en-AU" dirty="0" smtClean="0"/>
+              <a:t>New PCs are D3D 11, some ARM devices are D3D 9.3 (equivalent)</a:t>
+            </a:r>
+          </a:p>
+          <a:p>
+            <a:r>
+              <a:rPr lang="en-AU" dirty="0" smtClean="0"/>
+              <a:t>Test your game</a:t>
+            </a:r>
+          </a:p>
+        </p:txBody>
+      </p:sp>
+    </p:spTree>
+    <p:extLst>
+      <p:ext uri="{BB962C8B-B14F-4D97-AF65-F5344CB8AC3E}">
+        <p14:creationId xmlns:p14="http://schemas.microsoft.com/office/powerpoint/2010/main" val="690564962"/>
+      </p:ext>
+    </p:extLst>
+  </p:cSld>
+  <p:clrMapOvr>
+    <a:masterClrMapping/>
+  </p:clrMapOvr>
+</p:sld>
+</file>
+
+<file path=ppt/slides/slide12.xml><?xml version="1.0" encoding="utf-8"?>
+<p:sld xmlns:a="http://schemas.openxmlformats.org/drawingml/2006/main" xmlns:r="http://schemas.openxmlformats.org/officeDocument/2006/relationships" xmlns:p="http://schemas.openxmlformats.org/presentationml/2006/main">
+  <p:cSld>
+    <p:spTree>
+      <p:nvGrpSpPr>
+        <p:cNvPr id="1" name=""/>
+        <p:cNvGrpSpPr/>
+        <p:nvPr/>
+      </p:nvGrpSpPr>
+      <p:grpSpPr>
+        <a:xfrm>
+          <a:off x="0" y="0"/>
+          <a:ext cx="0" cy="0"/>
+          <a:chOff x="0" y="0"/>
+          <a:chExt cx="0" cy="0"/>
+        </a:xfrm>
+      </p:grpSpPr>
+      <p:sp>
+        <p:nvSpPr>
+          <p:cNvPr id="2" name="Title 1"/>
+          <p:cNvSpPr>
+            <a:spLocks noGrp="1"/>
+          </p:cNvSpPr>
+          <p:nvPr>
+            <p:ph type="title"/>
+          </p:nvPr>
+        </p:nvSpPr>
+        <p:spPr/>
+        <p:txBody>
+          <a:bodyPr/>
+          <a:lstStyle/>
+          <a:p>
+            <a:r>
+              <a:rPr lang="en-AU" dirty="0" smtClean="0"/>
+              <a:t>Debugging with Visual Studio</a:t>
+            </a:r>
+            <a:endParaRPr lang="en-AU" dirty="0"/>
+          </a:p>
+        </p:txBody>
+      </p:sp>
+      <p:sp>
+        <p:nvSpPr>
+          <p:cNvPr id="3" name="Content Placeholder 2"/>
+          <p:cNvSpPr>
+            <a:spLocks noGrp="1"/>
+          </p:cNvSpPr>
+          <p:nvPr>
+            <p:ph idx="1"/>
+          </p:nvPr>
+        </p:nvSpPr>
+        <p:spPr/>
+        <p:txBody>
+          <a:bodyPr/>
+          <a:lstStyle/>
+          <a:p>
+            <a:r>
+              <a:rPr lang="en-AU" dirty="0" smtClean="0"/>
+              <a:t>Build for Windows Store (WSA)</a:t>
+            </a:r>
+          </a:p>
+          <a:p>
+            <a:r>
+              <a:rPr lang="en-AU" dirty="0" smtClean="0"/>
+              <a:t>Generate </a:t>
+            </a:r>
+            <a:r>
+              <a:rPr lang="en-AU" dirty="0" err="1" smtClean="0"/>
+              <a:t>MonoDevelop</a:t>
+            </a:r>
+            <a:r>
+              <a:rPr lang="en-AU" dirty="0" smtClean="0"/>
+              <a:t>/</a:t>
+            </a:r>
+            <a:r>
+              <a:rPr lang="en-AU" dirty="0" err="1" smtClean="0"/>
+              <a:t>UnityVS</a:t>
+            </a:r>
+            <a:r>
+              <a:rPr lang="en-AU" dirty="0" smtClean="0"/>
+              <a:t> projects</a:t>
+            </a:r>
+          </a:p>
+          <a:p>
+            <a:r>
+              <a:rPr lang="en-AU" dirty="0" smtClean="0"/>
+              <a:t>Add generated </a:t>
+            </a:r>
+            <a:r>
+              <a:rPr lang="en-AU" dirty="0" err="1" smtClean="0"/>
+              <a:t>Csharp</a:t>
+            </a:r>
+            <a:r>
+              <a:rPr lang="en-AU" dirty="0" smtClean="0"/>
+              <a:t> projects to WSA solution</a:t>
+            </a:r>
+          </a:p>
+          <a:p>
+            <a:r>
+              <a:rPr lang="en-AU" dirty="0" smtClean="0"/>
+              <a:t>Edit Build </a:t>
+            </a:r>
+            <a:r>
+              <a:rPr lang="en-AU" dirty="0" err="1" smtClean="0"/>
+              <a:t>Config</a:t>
+            </a:r>
+            <a:r>
+              <a:rPr lang="en-AU" dirty="0" smtClean="0"/>
+              <a:t> and remove those projects (to avoid compile errors)</a:t>
+            </a:r>
+          </a:p>
+          <a:p>
+            <a:r>
+              <a:rPr lang="en-AU" dirty="0" smtClean="0"/>
+              <a:t>Edit and Rebuild in Unity</a:t>
+            </a:r>
+          </a:p>
+          <a:p>
+            <a:pPr lvl="1"/>
+            <a:r>
+              <a:rPr lang="en-AU" dirty="0" smtClean="0"/>
+              <a:t>This will change in future versions</a:t>
+            </a:r>
+          </a:p>
+          <a:p>
+            <a:r>
+              <a:rPr lang="en-AU" dirty="0" smtClean="0"/>
+              <a:t>Rinse &amp; Repeat</a:t>
+            </a:r>
+          </a:p>
+        </p:txBody>
+      </p:sp>
+    </p:spTree>
+    <p:extLst>
+      <p:ext uri="{BB962C8B-B14F-4D97-AF65-F5344CB8AC3E}">
+        <p14:creationId xmlns:p14="http://schemas.microsoft.com/office/powerpoint/2010/main" val="560916964"/>
+      </p:ext>
+    </p:extLst>
+  </p:cSld>
+  <p:clrMapOvr>
+    <a:masterClrMapping/>
+  </p:clrMapOvr>
+</p:sld>
+</file>
+
+<file path=ppt/slides/slide13.xml><?xml version="1.0" encoding="utf-8"?>
+<p:sld xmlns:a="http://schemas.openxmlformats.org/drawingml/2006/main" xmlns:r="http://schemas.openxmlformats.org/officeDocument/2006/relationships" xmlns:p="http://schemas.openxmlformats.org/presentationml/2006/main">
+  <p:cSld>
+    <p:spTree>
+      <p:nvGrpSpPr>
+        <p:cNvPr id="1" name=""/>
+        <p:cNvGrpSpPr/>
+        <p:nvPr/>
+      </p:nvGrpSpPr>
+      <p:grpSpPr>
+        <a:xfrm>
+          <a:off x="0" y="0"/>
+          <a:ext cx="0" cy="0"/>
+          <a:chOff x="0" y="0"/>
+          <a:chExt cx="0" cy="0"/>
+        </a:xfrm>
+      </p:grpSpPr>
+      <p:sp>
+        <p:nvSpPr>
+          <p:cNvPr id="2" name="Title 1"/>
+          <p:cNvSpPr>
+            <a:spLocks noGrp="1"/>
+          </p:cNvSpPr>
+          <p:nvPr>
+            <p:ph type="title"/>
+          </p:nvPr>
+        </p:nvSpPr>
+        <p:spPr/>
+        <p:txBody>
+          <a:bodyPr/>
+          <a:lstStyle/>
+          <a:p>
+            <a:r>
+              <a:rPr lang="en-AU" dirty="0" smtClean="0"/>
+              <a:t>One More Thing…</a:t>
+            </a:r>
+            <a:endParaRPr lang="en-AU" dirty="0"/>
+          </a:p>
+        </p:txBody>
+      </p:sp>
+      <p:sp>
+        <p:nvSpPr>
+          <p:cNvPr id="3" name="Content Placeholder 2"/>
+          <p:cNvSpPr>
+            <a:spLocks noGrp="1"/>
+          </p:cNvSpPr>
+          <p:nvPr>
+            <p:ph idx="1"/>
+          </p:nvPr>
+        </p:nvSpPr>
+        <p:spPr>
+          <a:xfrm>
+            <a:off x="838200" y="1825625"/>
+            <a:ext cx="7273954" cy="4351338"/>
+          </a:xfrm>
+        </p:spPr>
+        <p:txBody>
+          <a:bodyPr/>
+          <a:lstStyle/>
+          <a:p>
+            <a:pPr marL="0" indent="0">
+              <a:buNone/>
+            </a:pPr>
+            <a:r>
+              <a:rPr lang="en-AU" dirty="0" smtClean="0"/>
+              <a:t>If you have this ticked -&gt;</a:t>
+            </a:r>
+          </a:p>
+          <a:p>
+            <a:pPr marL="0" indent="0">
+              <a:buNone/>
+            </a:pPr>
+            <a:r>
+              <a:rPr lang="en-AU" dirty="0" smtClean="0"/>
+              <a:t>(</a:t>
+            </a:r>
+            <a:r>
+              <a:rPr lang="en-AU" smtClean="0"/>
+              <a:t>Internet Client)</a:t>
+            </a:r>
+            <a:endParaRPr lang="en-AU" dirty="0"/>
+          </a:p>
+          <a:p>
+            <a:pPr marL="0" indent="0">
+              <a:buNone/>
+            </a:pPr>
+            <a:endParaRPr lang="en-AU" dirty="0" smtClean="0"/>
+          </a:p>
+          <a:p>
+            <a:pPr marL="0" indent="0">
+              <a:buNone/>
+            </a:pPr>
+            <a:endParaRPr lang="en-AU" dirty="0"/>
+          </a:p>
+          <a:p>
+            <a:pPr marL="0" indent="0">
+              <a:buNone/>
+            </a:pPr>
+            <a:r>
+              <a:rPr lang="en-AU" dirty="0" smtClean="0"/>
+              <a:t>Add a link to your Privacy Policy within the game.</a:t>
+            </a:r>
+          </a:p>
+          <a:p>
+            <a:pPr marL="0" indent="0">
+              <a:buNone/>
+            </a:pPr>
+            <a:r>
+              <a:rPr lang="en-AU" dirty="0" smtClean="0"/>
+              <a:t>(You can use the settings menu for this in XAML)</a:t>
+            </a:r>
+          </a:p>
+        </p:txBody>
+      </p:sp>
+      <p:pic>
+        <p:nvPicPr>
+          <p:cNvPr id="4" name="Picture 3" descr="Unity - Untitled - unity - PC, Mac &amp; Linux Standalone &lt;DX11&gt;"/>
+          <p:cNvPicPr>
+            <a:picLocks noChangeAspect="1"/>
+          </p:cNvPicPr>
+          <p:nvPr/>
+        </p:nvPicPr>
+        <p:blipFill rotWithShape="1">
+          <a:blip r:embed="rId2" cstate="print">
+            <a:extLst>
+              <a:ext uri="{28A0092B-C50C-407E-A947-70E740481C1C}">
+                <a14:useLocalDpi xmlns:a14="http://schemas.microsoft.com/office/drawing/2010/main" val="0"/>
+              </a:ext>
+            </a:extLst>
+          </a:blip>
+          <a:srcRect/>
+          <a:stretch/>
+        </p:blipFill>
+        <p:spPr>
+          <a:xfrm>
+            <a:off x="5771624" y="1439731"/>
+            <a:ext cx="3942311" cy="1890698"/>
+          </a:xfrm>
+          <a:prstGeom prst="rect">
+            <a:avLst/>
+          </a:prstGeom>
+        </p:spPr>
+      </p:pic>
+    </p:spTree>
+    <p:extLst>
+      <p:ext uri="{BB962C8B-B14F-4D97-AF65-F5344CB8AC3E}">
+        <p14:creationId xmlns:p14="http://schemas.microsoft.com/office/powerpoint/2010/main" val="2237506171"/>
       </p:ext>
     </p:extLst>
   </p:cSld>
@@ -3074,7 +3667,11 @@
           <a:p>
             <a:r>
               <a:rPr lang="en-AU" dirty="0" smtClean="0"/>
-              <a:t>Step 1 – Upgrade Unity (optional)</a:t>
+              <a:t>Step 1 – Upgrade Unity </a:t>
+            </a:r>
+            <a:r>
+              <a:rPr lang="en-AU" dirty="0" smtClean="0"/>
+              <a:t>(as required)</a:t>
             </a:r>
             <a:endParaRPr lang="en-AU" dirty="0"/>
           </a:p>
@@ -3446,6 +4043,13 @@
               <a:rPr lang="en-AU" dirty="0" smtClean="0"/>
               <a:t>Assets\Plugins\Metro</a:t>
             </a:r>
+          </a:p>
+          <a:p>
+            <a:pPr lvl="1"/>
+            <a:r>
+              <a:rPr lang="en-AU" dirty="0" smtClean="0"/>
+              <a:t>Assets\Plugins\WP8</a:t>
+            </a:r>
             <a:endParaRPr lang="en-AU" dirty="0"/>
           </a:p>
         </p:txBody>
@@ -3497,7 +4101,7 @@
           <a:p>
             <a:r>
               <a:rPr lang="en-AU" dirty="0" smtClean="0"/>
-              <a:t>Step 3 - WACK</a:t>
+              <a:t>Plugin Build Errors</a:t>
             </a:r>
             <a:endParaRPr lang="en-AU" dirty="0"/>
           </a:p>
@@ -3510,114 +4114,108 @@
             <a:spLocks noGrp="1"/>
           </p:cNvSpPr>
           <p:nvPr>
-            <p:ph sz="half" idx="1"/>
-          </p:nvPr>
-        </p:nvSpPr>
-        <p:spPr/>
-        <p:txBody>
-          <a:bodyPr/>
-          <a:lstStyle/>
-          <a:p>
-            <a:r>
-              <a:rPr lang="en-AU" dirty="0" smtClean="0"/>
-              <a:t>Build your Windows 8 solution</a:t>
-            </a:r>
-          </a:p>
-          <a:p>
-            <a:r>
-              <a:rPr lang="en-AU" dirty="0" smtClean="0"/>
-              <a:t>If the game runs fine:</a:t>
+            <p:ph idx="1"/>
+          </p:nvPr>
+        </p:nvSpPr>
+        <p:spPr/>
+        <p:txBody>
+          <a:bodyPr/>
+          <a:lstStyle/>
+          <a:p>
+            <a:r>
+              <a:rPr lang="en-AU" dirty="0" smtClean="0"/>
+              <a:t>Unity still wants to use an incompatible DLL?</a:t>
             </a:r>
           </a:p>
           <a:p>
             <a:pPr lvl="1"/>
             <a:r>
               <a:rPr lang="en-AU" dirty="0" smtClean="0"/>
-              <a:t>Deploy in Release mode</a:t>
+              <a:t>Mark as Unprocessed</a:t>
             </a:r>
           </a:p>
           <a:p>
             <a:pPr lvl="1"/>
             <a:r>
               <a:rPr lang="en-AU" dirty="0" smtClean="0"/>
-              <a:t>Run the Windows App Cert Kit (WACK 3.1 *)</a:t>
-            </a:r>
-          </a:p>
-          <a:p>
-            <a:pPr lvl="1"/>
-            <a:r>
-              <a:rPr lang="en-AU" dirty="0" smtClean="0"/>
-              <a:t>Check results and fix any issues</a:t>
-            </a:r>
-          </a:p>
-          <a:p>
-            <a:r>
-              <a:rPr lang="en-AU" dirty="0" smtClean="0"/>
-              <a:t>Check WACK on ARM if possible</a:t>
-            </a:r>
-          </a:p>
-          <a:p>
-            <a:pPr lvl="1"/>
-            <a:r>
-              <a:rPr lang="en-AU" dirty="0" smtClean="0"/>
-              <a:t>Performance</a:t>
-            </a:r>
-          </a:p>
-        </p:txBody>
-      </p:sp>
-      <p:sp>
-        <p:nvSpPr>
-          <p:cNvPr id="4" name="Content Placeholder 3"/>
-          <p:cNvSpPr>
-            <a:spLocks noGrp="1"/>
-          </p:cNvSpPr>
-          <p:nvPr>
-            <p:ph sz="half" idx="2"/>
-          </p:nvPr>
-        </p:nvSpPr>
-        <p:spPr/>
-        <p:txBody>
-          <a:bodyPr/>
-          <a:lstStyle/>
-          <a:p>
-            <a:endParaRPr lang="en-AU"/>
-          </a:p>
-        </p:txBody>
-      </p:sp>
-      <p:sp>
-        <p:nvSpPr>
-          <p:cNvPr id="5" name="TextBox 4"/>
-          <p:cNvSpPr txBox="1"/>
+              <a:t>Delete from build output</a:t>
+            </a:r>
+            <a:endParaRPr lang="en-AU" dirty="0"/>
+          </a:p>
+        </p:txBody>
+      </p:sp>
+      <p:pic>
+        <p:nvPicPr>
+          <p:cNvPr id="4" name="Picture 3" descr="Unity - Untitled - LD29 - PC, Mac &amp; Linux Standalone &lt;DX11&gt;"/>
+          <p:cNvPicPr>
+            <a:picLocks noChangeAspect="1"/>
+          </p:cNvPicPr>
           <p:nvPr/>
-        </p:nvSpPr>
+        </p:nvPicPr>
+        <p:blipFill rotWithShape="1">
+          <a:blip r:embed="rId2">
+            <a:extLst>
+              <a:ext uri="{28A0092B-C50C-407E-A947-70E740481C1C}">
+                <a14:useLocalDpi xmlns:a14="http://schemas.microsoft.com/office/drawing/2010/main" val="0"/>
+              </a:ext>
+            </a:extLst>
+          </a:blip>
+          <a:srcRect l="42764" t="48406" r="47499" b="42028"/>
+          <a:stretch/>
+        </p:blipFill>
         <p:spPr>
           <a:xfrm>
-            <a:off x="7698056" y="6311900"/>
-            <a:ext cx="3655744" cy="369332"/>
+            <a:off x="1608991" y="3719939"/>
+            <a:ext cx="3174023" cy="1692811"/>
           </a:xfrm>
           <a:prstGeom prst="rect">
             <a:avLst/>
           </a:prstGeom>
-          <a:noFill/>
         </p:spPr>
-        <p:txBody>
-          <a:bodyPr wrap="none" rtlCol="0">
-            <a:spAutoFit/>
-          </a:bodyPr>
-          <a:lstStyle/>
-          <a:p>
-            <a:r>
-              <a:rPr lang="en-AU" dirty="0" smtClean="0"/>
-              <a:t>* Versions are valid as of 19/03/2014</a:t>
-            </a:r>
-            <a:endParaRPr lang="en-AU" dirty="0"/>
-          </a:p>
-        </p:txBody>
-      </p:sp>
+      </p:pic>
+      <mc:AlternateContent xmlns:mc="http://schemas.openxmlformats.org/markup-compatibility/2006">
+        <mc:Choice xmlns:p14="http://schemas.microsoft.com/office/powerpoint/2010/main" Requires="p14">
+          <p:contentPart p14:bwMode="auto" r:id="rId3">
+            <p14:nvContentPartPr>
+              <p14:cNvPr id="6" name="Ink 5"/>
+              <p14:cNvContentPartPr/>
+              <p14:nvPr/>
+            </p14:nvContentPartPr>
+            <p14:xfrm>
+              <a:off x="1101960" y="4527083"/>
+              <a:ext cx="3265560" cy="1033200"/>
+            </p14:xfrm>
+          </p:contentPart>
+        </mc:Choice>
+        <mc:Fallback>
+          <p:pic>
+            <p:nvPicPr>
+              <p:cNvPr id="6" name="Ink 5"/>
+              <p:cNvPicPr/>
+              <p:nvPr/>
+            </p:nvPicPr>
+            <p:blipFill>
+              <a:blip r:embed="rId4"/>
+              <a:stretch>
+                <a:fillRect/>
+              </a:stretch>
+            </p:blipFill>
+            <p:spPr>
+              <a:xfrm>
+                <a:off x="1086120" y="4511603"/>
+                <a:ext cx="3299040" cy="1064880"/>
+              </a:xfrm>
+              <a:prstGeom prst="rect">
+                <a:avLst/>
+              </a:prstGeom>
+            </p:spPr>
+          </p:pic>
+        </mc:Fallback>
+      </mc:AlternateContent>
     </p:spTree>
     <p:extLst>
       <p:ext uri="{BB962C8B-B14F-4D97-AF65-F5344CB8AC3E}">
-        <p14:creationId xmlns:p14="http://schemas.microsoft.com/office/powerpoint/2010/main" val="4111779873"/>
+        <p14:creationId xmlns:p14="http://schemas.microsoft.com/office/powerpoint/2010/main" val="2898556444"/>
       </p:ext>
     </p:extLst>
   </p:cSld>
@@ -3661,7 +4259,7 @@
           <a:p>
             <a:r>
               <a:rPr lang="en-AU" dirty="0" smtClean="0"/>
-              <a:t>Possible WACK Issues</a:t>
+              <a:t>Platform Macros</a:t>
             </a:r>
             <a:endParaRPr lang="en-AU" dirty="0"/>
           </a:p>
@@ -3684,70 +4282,35 @@
           <a:p>
             <a:r>
               <a:rPr lang="en-AU" dirty="0" smtClean="0"/>
-              <a:t>Trim() required on suspend</a:t>
+              <a:t>Unity 4.3.4</a:t>
             </a:r>
           </a:p>
           <a:p>
             <a:pPr lvl="1"/>
             <a:r>
               <a:rPr lang="en-AU" dirty="0" smtClean="0"/>
-              <a:t>Stop using WACK 3.2, it’s broken and was accidentally included in VS 2013 Update 1 – use WACK 3.1*</a:t>
-            </a:r>
-          </a:p>
-          <a:p>
-            <a:r>
-              <a:rPr lang="en-AU" dirty="0" smtClean="0"/>
-              <a:t>Illegal APIs</a:t>
+              <a:t>UNITY_METRO</a:t>
             </a:r>
           </a:p>
           <a:p>
             <a:pPr lvl="1"/>
             <a:r>
               <a:rPr lang="en-AU" dirty="0" smtClean="0"/>
-              <a:t>Replace or remove</a:t>
+              <a:t>UNITY_WP8</a:t>
             </a:r>
           </a:p>
           <a:p>
             <a:pPr lvl="1"/>
             <a:r>
               <a:rPr lang="en-AU" dirty="0" smtClean="0"/>
-              <a:t>Usually a native plugin</a:t>
+              <a:t>UNITY_WINRT = (UNITY_METRO || UNITY_WP8)</a:t>
             </a:r>
           </a:p>
           <a:p>
             <a:pPr lvl="1"/>
             <a:r>
               <a:rPr lang="en-AU" dirty="0" smtClean="0"/>
-              <a:t>Ensure you compiled with .NET Core enabled (forced)</a:t>
-            </a:r>
-          </a:p>
-        </p:txBody>
-      </p:sp>
-      <p:sp>
-        <p:nvSpPr>
-          <p:cNvPr id="4" name="TextBox 3"/>
-          <p:cNvSpPr txBox="1"/>
-          <p:nvPr/>
-        </p:nvSpPr>
-        <p:spPr>
-          <a:xfrm>
-            <a:off x="7698056" y="6311900"/>
-            <a:ext cx="3655744" cy="369332"/>
-          </a:xfrm>
-          <a:prstGeom prst="rect">
-            <a:avLst/>
-          </a:prstGeom>
-          <a:noFill/>
-        </p:spPr>
-        <p:txBody>
-          <a:bodyPr wrap="none" rtlCol="0">
-            <a:spAutoFit/>
-          </a:bodyPr>
-          <a:lstStyle/>
-          <a:p>
-            <a:r>
-              <a:rPr lang="en-AU" dirty="0" smtClean="0"/>
-              <a:t>* Versions are valid as of 19/03/2014</a:t>
+              <a:t>UNITY_EDITOR</a:t>
             </a:r>
             <a:endParaRPr lang="en-AU" dirty="0"/>
           </a:p>
@@ -3756,7 +4319,7 @@
     </p:spTree>
     <p:extLst>
       <p:ext uri="{BB962C8B-B14F-4D97-AF65-F5344CB8AC3E}">
-        <p14:creationId xmlns:p14="http://schemas.microsoft.com/office/powerpoint/2010/main" val="475539485"/>
+        <p14:creationId xmlns:p14="http://schemas.microsoft.com/office/powerpoint/2010/main" val="856175786"/>
       </p:ext>
     </p:extLst>
   </p:cSld>
@@ -3800,7 +4363,7 @@
           <a:p>
             <a:r>
               <a:rPr lang="en-AU" dirty="0" smtClean="0"/>
-              <a:t>Step 4 – Windows 8 Features</a:t>
+              <a:t>Common Missing APIs</a:t>
             </a:r>
             <a:endParaRPr lang="en-AU" dirty="0"/>
           </a:p>
@@ -3808,7 +4371,7 @@
       </p:sp>
       <p:sp>
         <p:nvSpPr>
-          <p:cNvPr id="5" name="Content Placeholder 4"/>
+          <p:cNvPr id="3" name="Content Placeholder 2"/>
           <p:cNvSpPr>
             <a:spLocks noGrp="1"/>
           </p:cNvSpPr>
@@ -3822,45 +4385,99 @@
           <a:lstStyle/>
           <a:p>
             <a:r>
-              <a:rPr lang="en-AU" dirty="0" smtClean="0"/>
-              <a:t>Resizable screen (needs to be responsive)</a:t>
-            </a:r>
+              <a:rPr lang="en-AU" dirty="0" err="1" smtClean="0"/>
+              <a:t>Hashtable</a:t>
+            </a:r>
+            <a:endParaRPr lang="en-AU" dirty="0" smtClean="0"/>
           </a:p>
           <a:p>
             <a:pPr lvl="1"/>
             <a:r>
               <a:rPr lang="en-AU" dirty="0" smtClean="0"/>
-              <a:t>Choose from 320px or 500px minimum</a:t>
-            </a:r>
-          </a:p>
-          <a:p>
-            <a:r>
-              <a:rPr lang="en-AU" dirty="0" smtClean="0"/>
-              <a:t>Connect game to App Lifecycle (if required)</a:t>
-            </a:r>
-          </a:p>
-          <a:p>
-            <a:r>
-              <a:rPr lang="en-AU" dirty="0" smtClean="0"/>
-              <a:t>Live Tiles</a:t>
-            </a:r>
-          </a:p>
-          <a:p>
-            <a:r>
-              <a:rPr lang="en-AU" dirty="0" smtClean="0"/>
-              <a:t>Share Charm</a:t>
-            </a:r>
-          </a:p>
-          <a:p>
-            <a:r>
-              <a:rPr lang="en-AU" dirty="0" smtClean="0"/>
-              <a:t>Keyboard &amp; Mouse Support</a:t>
-            </a:r>
-          </a:p>
-          <a:p>
-            <a:r>
-              <a:rPr lang="en-AU" dirty="0" smtClean="0"/>
-              <a:t>Required Icon Assets (Small/Medium/Large tiles + Splash Screen)</a:t>
+              <a:t>Implemented by Unity post 4.2 in WinRTLegacy.dll</a:t>
+            </a:r>
+          </a:p>
+          <a:p>
+            <a:pPr lvl="1"/>
+            <a:r>
+              <a:rPr lang="en-AU" dirty="0" smtClean="0"/>
+              <a:t>new WWW() wants Dictionary&lt;</a:t>
+            </a:r>
+            <a:r>
+              <a:rPr lang="en-AU" dirty="0" err="1" smtClean="0"/>
+              <a:t>string,string</a:t>
+            </a:r>
+            <a:r>
+              <a:rPr lang="en-AU" dirty="0" smtClean="0"/>
+              <a:t>&gt; instead</a:t>
+            </a:r>
+          </a:p>
+          <a:p>
+            <a:pPr lvl="2"/>
+            <a:r>
+              <a:rPr lang="en-AU" dirty="0" smtClean="0"/>
+              <a:t>Just replace your </a:t>
+            </a:r>
+            <a:r>
+              <a:rPr lang="en-AU" dirty="0" err="1" smtClean="0"/>
+              <a:t>Hashtables</a:t>
+            </a:r>
+            <a:r>
+              <a:rPr lang="en-AU" dirty="0" smtClean="0"/>
+              <a:t> (same interface)</a:t>
+            </a:r>
+          </a:p>
+          <a:p>
+            <a:r>
+              <a:rPr lang="en-AU" dirty="0" smtClean="0"/>
+              <a:t>Reflection</a:t>
+            </a:r>
+          </a:p>
+          <a:p>
+            <a:pPr lvl="1"/>
+            <a:r>
+              <a:rPr lang="en-AU" dirty="0" smtClean="0"/>
+              <a:t>Type methods are now in </a:t>
+            </a:r>
+            <a:r>
+              <a:rPr lang="en-AU" dirty="0" err="1" smtClean="0"/>
+              <a:t>TypeInfo</a:t>
+            </a:r>
+            <a:endParaRPr lang="en-AU" dirty="0" smtClean="0"/>
+          </a:p>
+          <a:p>
+            <a:pPr lvl="2"/>
+            <a:r>
+              <a:rPr lang="en-AU" dirty="0" smtClean="0"/>
+              <a:t>Porting sample has partial implementation of Type</a:t>
+            </a:r>
+          </a:p>
+          <a:p>
+            <a:pPr lvl="1"/>
+            <a:r>
+              <a:rPr lang="en-AU" dirty="0" err="1" smtClean="0"/>
+              <a:t>Codegen</a:t>
+            </a:r>
+            <a:r>
+              <a:rPr lang="en-AU" dirty="0"/>
+              <a:t> </a:t>
+            </a:r>
+            <a:r>
+              <a:rPr lang="en-AU" dirty="0" smtClean="0"/>
+              <a:t>not permitted</a:t>
+            </a:r>
+          </a:p>
+          <a:p>
+            <a:r>
+              <a:rPr lang="en-AU" dirty="0" smtClean="0"/>
+              <a:t>File/Directory</a:t>
+            </a:r>
+          </a:p>
+          <a:p>
+            <a:pPr lvl="1"/>
+            <a:r>
+              <a:rPr lang="en-AU" dirty="0" smtClean="0"/>
+              <a:t>Same as Reflection</a:t>
             </a:r>
           </a:p>
         </p:txBody>
@@ -3868,7 +4485,7 @@
     </p:spTree>
     <p:extLst>
       <p:ext uri="{BB962C8B-B14F-4D97-AF65-F5344CB8AC3E}">
-        <p14:creationId xmlns:p14="http://schemas.microsoft.com/office/powerpoint/2010/main" val="3441485953"/>
+        <p14:creationId xmlns:p14="http://schemas.microsoft.com/office/powerpoint/2010/main" val="3583505864"/>
       </p:ext>
     </p:extLst>
   </p:cSld>
@@ -3912,7 +4529,7 @@
           <a:p>
             <a:r>
               <a:rPr lang="en-AU" dirty="0" smtClean="0"/>
-              <a:t>Finishing Touches</a:t>
+              <a:t>Step 3 - WACK</a:t>
             </a:r>
             <a:endParaRPr lang="en-AU" dirty="0"/>
           </a:p>
@@ -3925,78 +4542,114 @@
             <a:spLocks noGrp="1"/>
           </p:cNvSpPr>
           <p:nvPr>
-            <p:ph idx="1"/>
-          </p:nvPr>
-        </p:nvSpPr>
-        <p:spPr/>
-        <p:txBody>
-          <a:bodyPr/>
-          <a:lstStyle/>
-          <a:p>
-            <a:r>
-              <a:rPr lang="en-AU" dirty="0" smtClean="0"/>
-              <a:t>Polish your game</a:t>
+            <p:ph sz="half" idx="1"/>
+          </p:nvPr>
+        </p:nvSpPr>
+        <p:spPr/>
+        <p:txBody>
+          <a:bodyPr/>
+          <a:lstStyle/>
+          <a:p>
+            <a:r>
+              <a:rPr lang="en-AU" dirty="0" smtClean="0"/>
+              <a:t>Build your Windows 8 solution</a:t>
+            </a:r>
+          </a:p>
+          <a:p>
+            <a:r>
+              <a:rPr lang="en-AU" dirty="0" smtClean="0"/>
+              <a:t>If the game runs fine:</a:t>
             </a:r>
           </a:p>
           <a:p>
             <a:pPr lvl="1"/>
             <a:r>
               <a:rPr lang="en-AU" dirty="0" smtClean="0"/>
-              <a:t>Fluid loading experience</a:t>
+              <a:t>Deploy in Release mode</a:t>
             </a:r>
           </a:p>
           <a:p>
             <a:pPr lvl="1"/>
             <a:r>
               <a:rPr lang="en-AU" dirty="0" smtClean="0"/>
-              <a:t>Gamepad support</a:t>
-            </a:r>
-          </a:p>
-          <a:p>
-            <a:r>
-              <a:rPr lang="en-AU" dirty="0" smtClean="0"/>
-              <a:t>Check your assets</a:t>
+              <a:t>Run the Windows App Cert Kit (WACK 3.1 *)</a:t>
             </a:r>
           </a:p>
           <a:p>
             <a:pPr lvl="1"/>
             <a:r>
               <a:rPr lang="en-AU" dirty="0" smtClean="0"/>
-              <a:t>PVR textures will not work, convert to DXT</a:t>
-            </a:r>
-          </a:p>
-          <a:p>
-            <a:r>
-              <a:rPr lang="en-AU" dirty="0" smtClean="0"/>
-              <a:t>Check your Materials</a:t>
+              <a:t>Check results and fix any issues</a:t>
+            </a:r>
+          </a:p>
+          <a:p>
+            <a:r>
+              <a:rPr lang="en-AU" dirty="0" smtClean="0"/>
+              <a:t>Check WACK on ARM if possible</a:t>
             </a:r>
           </a:p>
           <a:p>
             <a:pPr lvl="1"/>
             <a:r>
               <a:rPr lang="en-AU" dirty="0" smtClean="0"/>
-              <a:t>Defaults will work, custom may not, check for Direct3D</a:t>
-            </a:r>
-          </a:p>
-          <a:p>
-            <a:pPr lvl="1"/>
-            <a:r>
-              <a:rPr lang="en-AU" dirty="0" smtClean="0"/>
-              <a:t>New PCs are D3D 11, some ARM devices are D3D 9.3 (equivalent)</a:t>
-            </a:r>
-          </a:p>
-          <a:p>
-            <a:r>
-              <a:rPr lang="en-AU" dirty="0" smtClean="0"/>
-              <a:t>Test your game</a:t>
-            </a:r>
+              <a:t>Performance</a:t>
+            </a:r>
+          </a:p>
+        </p:txBody>
+      </p:sp>
+      <p:sp>
+        <p:nvSpPr>
+          <p:cNvPr id="4" name="Content Placeholder 3"/>
+          <p:cNvSpPr>
+            <a:spLocks noGrp="1"/>
+          </p:cNvSpPr>
+          <p:nvPr>
+            <p:ph sz="half" idx="2"/>
+          </p:nvPr>
+        </p:nvSpPr>
+        <p:spPr/>
+        <p:txBody>
+          <a:bodyPr/>
+          <a:lstStyle/>
+          <a:p>
+            <a:endParaRPr lang="en-AU"/>
+          </a:p>
+        </p:txBody>
+      </p:sp>
+      <p:sp>
+        <p:nvSpPr>
+          <p:cNvPr id="5" name="TextBox 4"/>
+          <p:cNvSpPr txBox="1"/>
+          <p:nvPr/>
+        </p:nvSpPr>
+        <p:spPr>
+          <a:xfrm>
+            <a:off x="7698056" y="6311900"/>
+            <a:ext cx="3655744" cy="369332"/>
+          </a:xfrm>
+          <a:prstGeom prst="rect">
+            <a:avLst/>
+          </a:prstGeom>
+          <a:noFill/>
+        </p:spPr>
+        <p:txBody>
+          <a:bodyPr wrap="none" rtlCol="0">
+            <a:spAutoFit/>
+          </a:bodyPr>
+          <a:lstStyle/>
+          <a:p>
+            <a:r>
+              <a:rPr lang="en-AU" dirty="0" smtClean="0"/>
+              <a:t>* Versions are valid as of 19/03/2014</a:t>
+            </a:r>
+            <a:endParaRPr lang="en-AU" dirty="0"/>
           </a:p>
         </p:txBody>
       </p:sp>
     </p:spTree>
     <p:extLst>
       <p:ext uri="{BB962C8B-B14F-4D97-AF65-F5344CB8AC3E}">
-        <p14:creationId xmlns:p14="http://schemas.microsoft.com/office/powerpoint/2010/main" val="690564962"/>
+        <p14:creationId xmlns:p14="http://schemas.microsoft.com/office/powerpoint/2010/main" val="4111779873"/>
       </p:ext>
     </p:extLst>
   </p:cSld>
@@ -4040,7 +4693,7 @@
           <a:p>
             <a:r>
               <a:rPr lang="en-AU" dirty="0" smtClean="0"/>
-              <a:t>One More Thing…</a:t>
+              <a:t>Possible WACK Issues</a:t>
             </a:r>
             <a:endParaRPr lang="en-AU" dirty="0"/>
           </a:p>
@@ -4055,104 +4708,92 @@
           <p:nvPr>
             <p:ph idx="1"/>
           </p:nvPr>
+        </p:nvSpPr>
+        <p:spPr/>
+        <p:txBody>
+          <a:bodyPr/>
+          <a:lstStyle/>
+          <a:p>
+            <a:r>
+              <a:rPr lang="en-AU" dirty="0" smtClean="0"/>
+              <a:t>Trim() required on suspend</a:t>
+            </a:r>
+          </a:p>
+          <a:p>
+            <a:pPr lvl="1"/>
+            <a:r>
+              <a:rPr lang="en-AU" dirty="0" smtClean="0"/>
+              <a:t>You may have WACK 3.2, update to VS 2013 update 2 for WACK 3.3</a:t>
+            </a:r>
+            <a:endParaRPr lang="en-AU" dirty="0" smtClean="0"/>
+          </a:p>
+          <a:p>
+            <a:r>
+              <a:rPr lang="en-AU" dirty="0" smtClean="0"/>
+              <a:t>Illegal APIs</a:t>
+            </a:r>
+          </a:p>
+          <a:p>
+            <a:pPr lvl="1"/>
+            <a:r>
+              <a:rPr lang="en-AU" dirty="0" smtClean="0"/>
+              <a:t>Replace or remove</a:t>
+            </a:r>
+          </a:p>
+          <a:p>
+            <a:pPr lvl="1"/>
+            <a:r>
+              <a:rPr lang="en-AU" dirty="0" smtClean="0"/>
+              <a:t>Usually a native plugin</a:t>
+            </a:r>
+          </a:p>
+          <a:p>
+            <a:pPr lvl="1"/>
+            <a:r>
+              <a:rPr lang="en-AU" dirty="0" smtClean="0"/>
+              <a:t>Ensure you compiled with .NET Core enabled (forced)</a:t>
+            </a:r>
+          </a:p>
+        </p:txBody>
+      </p:sp>
+      <p:sp>
+        <p:nvSpPr>
+          <p:cNvPr id="4" name="TextBox 3"/>
+          <p:cNvSpPr txBox="1"/>
+          <p:nvPr/>
         </p:nvSpPr>
         <p:spPr>
           <a:xfrm>
-            <a:off x="838200" y="1825625"/>
-            <a:ext cx="7273954" cy="4351338"/>
-          </a:xfrm>
-        </p:spPr>
-        <p:txBody>
-          <a:bodyPr/>
-          <a:lstStyle/>
-          <a:p>
-            <a:pPr marL="0" indent="0">
-              <a:buNone/>
-            </a:pPr>
-            <a:r>
-              <a:rPr lang="en-AU" dirty="0" smtClean="0"/>
-              <a:t>If you have this ticked -&gt;</a:t>
-            </a:r>
-          </a:p>
-          <a:p>
-            <a:pPr marL="0" indent="0">
-              <a:buNone/>
-            </a:pPr>
-            <a:r>
-              <a:rPr lang="en-AU" dirty="0" smtClean="0"/>
-              <a:t>(</a:t>
-            </a:r>
-            <a:r>
-              <a:rPr lang="en-AU" smtClean="0"/>
-              <a:t>Internet Client)</a:t>
-            </a:r>
-            <a:endParaRPr lang="en-AU" dirty="0"/>
-          </a:p>
-          <a:p>
-            <a:pPr marL="0" indent="0">
-              <a:buNone/>
-            </a:pPr>
-            <a:endParaRPr lang="en-AU" dirty="0" smtClean="0"/>
-          </a:p>
-          <a:p>
-            <a:pPr marL="0" indent="0">
-              <a:buNone/>
-            </a:pPr>
-            <a:endParaRPr lang="en-AU" dirty="0"/>
-          </a:p>
-          <a:p>
-            <a:pPr marL="0" indent="0">
-              <a:buNone/>
-            </a:pPr>
-            <a:r>
-              <a:rPr lang="en-AU" dirty="0" smtClean="0"/>
-              <a:t>Add a link to your Privacy Policy within the game.</a:t>
-            </a:r>
-          </a:p>
-          <a:p>
-            <a:pPr marL="0" indent="0">
-              <a:buNone/>
-            </a:pPr>
-            <a:r>
-              <a:rPr lang="en-AU" dirty="0" smtClean="0"/>
-              <a:t>(You can use the settings menu for this in XAML)</a:t>
-            </a:r>
-          </a:p>
-        </p:txBody>
-      </p:sp>
-      <p:pic>
-        <p:nvPicPr>
-          <p:cNvPr id="4" name="Picture 3" descr="Unity - Untitled - unity - PC, Mac &amp; Linux Standalone &lt;DX11&gt;"/>
-          <p:cNvPicPr>
-            <a:picLocks noChangeAspect="1"/>
-          </p:cNvPicPr>
-          <p:nvPr/>
-        </p:nvPicPr>
-        <p:blipFill rotWithShape="1">
-          <a:blip r:embed="rId2" cstate="print">
-            <a:extLst>
-              <a:ext uri="{28A0092B-C50C-407E-A947-70E740481C1C}">
-                <a14:useLocalDpi xmlns:a14="http://schemas.microsoft.com/office/drawing/2010/main" val="0"/>
-              </a:ext>
-            </a:extLst>
-          </a:blip>
-          <a:srcRect/>
-          <a:stretch/>
-        </p:blipFill>
-        <p:spPr>
-          <a:xfrm>
-            <a:off x="5771624" y="1439731"/>
-            <a:ext cx="3942311" cy="1890698"/>
+            <a:off x="7706848" y="6311900"/>
+            <a:ext cx="3655744" cy="369332"/>
           </a:xfrm>
           <a:prstGeom prst="rect">
             <a:avLst/>
           </a:prstGeom>
+          <a:noFill/>
         </p:spPr>
-      </p:pic>
+        <p:txBody>
+          <a:bodyPr wrap="none" rtlCol="0">
+            <a:spAutoFit/>
+          </a:bodyPr>
+          <a:lstStyle/>
+          <a:p>
+            <a:r>
+              <a:rPr lang="en-AU" dirty="0" smtClean="0"/>
+              <a:t>* Versions are valid as of </a:t>
+            </a:r>
+            <a:r>
+              <a:rPr lang="en-AU" dirty="0" smtClean="0"/>
+              <a:t>03/05/2014</a:t>
+            </a:r>
+            <a:endParaRPr lang="en-AU" dirty="0"/>
+          </a:p>
+        </p:txBody>
+      </p:sp>
     </p:spTree>
     <p:extLst>
       <p:ext uri="{BB962C8B-B14F-4D97-AF65-F5344CB8AC3E}">
-        <p14:creationId xmlns:p14="http://schemas.microsoft.com/office/powerpoint/2010/main" val="2237506171"/>
+        <p14:creationId xmlns:p14="http://schemas.microsoft.com/office/powerpoint/2010/main" val="475539485"/>
       </p:ext>
     </p:extLst>
   </p:cSld>

</xml_diff>

<commit_message>
Added missing winrt types link
</commit_message>
<xml_diff>
--- a/PortingUnity_Win8.pptx
+++ b/PortingUnity_Win8.pptx
@@ -296,7 +296,7 @@
           <a:p>
             <a:fld id="{EB741852-085B-4304-A0BB-F6C62D9D1BEF}" type="datetimeFigureOut">
               <a:rPr lang="en-AU" smtClean="0"/>
-              <a:t>3/05/2014</a:t>
+              <a:t>5/05/2014</a:t>
             </a:fld>
             <a:endParaRPr lang="en-AU"/>
           </a:p>
@@ -466,7 +466,7 @@
           <a:p>
             <a:fld id="{EB741852-085B-4304-A0BB-F6C62D9D1BEF}" type="datetimeFigureOut">
               <a:rPr lang="en-AU" smtClean="0"/>
-              <a:t>3/05/2014</a:t>
+              <a:t>5/05/2014</a:t>
             </a:fld>
             <a:endParaRPr lang="en-AU"/>
           </a:p>
@@ -646,7 +646,7 @@
           <a:p>
             <a:fld id="{EB741852-085B-4304-A0BB-F6C62D9D1BEF}" type="datetimeFigureOut">
               <a:rPr lang="en-AU" smtClean="0"/>
-              <a:t>3/05/2014</a:t>
+              <a:t>5/05/2014</a:t>
             </a:fld>
             <a:endParaRPr lang="en-AU"/>
           </a:p>
@@ -816,7 +816,7 @@
           <a:p>
             <a:fld id="{EB741852-085B-4304-A0BB-F6C62D9D1BEF}" type="datetimeFigureOut">
               <a:rPr lang="en-AU" smtClean="0"/>
-              <a:t>3/05/2014</a:t>
+              <a:t>5/05/2014</a:t>
             </a:fld>
             <a:endParaRPr lang="en-AU"/>
           </a:p>
@@ -1062,7 +1062,7 @@
           <a:p>
             <a:fld id="{EB741852-085B-4304-A0BB-F6C62D9D1BEF}" type="datetimeFigureOut">
               <a:rPr lang="en-AU" smtClean="0"/>
-              <a:t>3/05/2014</a:t>
+              <a:t>5/05/2014</a:t>
             </a:fld>
             <a:endParaRPr lang="en-AU"/>
           </a:p>
@@ -1294,7 +1294,7 @@
           <a:p>
             <a:fld id="{EB741852-085B-4304-A0BB-F6C62D9D1BEF}" type="datetimeFigureOut">
               <a:rPr lang="en-AU" smtClean="0"/>
-              <a:t>3/05/2014</a:t>
+              <a:t>5/05/2014</a:t>
             </a:fld>
             <a:endParaRPr lang="en-AU"/>
           </a:p>
@@ -1661,7 +1661,7 @@
           <a:p>
             <a:fld id="{EB741852-085B-4304-A0BB-F6C62D9D1BEF}" type="datetimeFigureOut">
               <a:rPr lang="en-AU" smtClean="0"/>
-              <a:t>3/05/2014</a:t>
+              <a:t>5/05/2014</a:t>
             </a:fld>
             <a:endParaRPr lang="en-AU"/>
           </a:p>
@@ -1779,7 +1779,7 @@
           <a:p>
             <a:fld id="{EB741852-085B-4304-A0BB-F6C62D9D1BEF}" type="datetimeFigureOut">
               <a:rPr lang="en-AU" smtClean="0"/>
-              <a:t>3/05/2014</a:t>
+              <a:t>5/05/2014</a:t>
             </a:fld>
             <a:endParaRPr lang="en-AU"/>
           </a:p>
@@ -1874,7 +1874,7 @@
           <a:p>
             <a:fld id="{EB741852-085B-4304-A0BB-F6C62D9D1BEF}" type="datetimeFigureOut">
               <a:rPr lang="en-AU" smtClean="0"/>
-              <a:t>3/05/2014</a:t>
+              <a:t>5/05/2014</a:t>
             </a:fld>
             <a:endParaRPr lang="en-AU"/>
           </a:p>
@@ -2151,7 +2151,7 @@
           <a:p>
             <a:fld id="{EB741852-085B-4304-A0BB-F6C62D9D1BEF}" type="datetimeFigureOut">
               <a:rPr lang="en-AU" smtClean="0"/>
-              <a:t>3/05/2014</a:t>
+              <a:t>5/05/2014</a:t>
             </a:fld>
             <a:endParaRPr lang="en-AU"/>
           </a:p>
@@ -2404,7 +2404,7 @@
           <a:p>
             <a:fld id="{EB741852-085B-4304-A0BB-F6C62D9D1BEF}" type="datetimeFigureOut">
               <a:rPr lang="en-AU" smtClean="0"/>
-              <a:t>3/05/2014</a:t>
+              <a:t>5/05/2014</a:t>
             </a:fld>
             <a:endParaRPr lang="en-AU"/>
           </a:p>
@@ -2617,7 +2617,7 @@
           <a:p>
             <a:fld id="{EB741852-085B-4304-A0BB-F6C62D9D1BEF}" type="datetimeFigureOut">
               <a:rPr lang="en-AU" smtClean="0"/>
-              <a:t>3/05/2014</a:t>
+              <a:t>5/05/2014</a:t>
             </a:fld>
             <a:endParaRPr lang="en-AU"/>
           </a:p>
@@ -3722,9 +3722,42 @@
               <a:buNone/>
             </a:pPr>
             <a:r>
-              <a:rPr lang="en-AU" sz="4000" dirty="0"/>
-              <a:t>http://unity3d.com/pages/windows/porting</a:t>
-            </a:r>
+              <a:rPr lang="en-AU" sz="4000" dirty="0">
+                <a:hlinkClick r:id="rId2"/>
+              </a:rPr>
+              <a:t>http://</a:t>
+            </a:r>
+            <a:r>
+              <a:rPr lang="en-AU" sz="4000" dirty="0" smtClean="0">
+                <a:hlinkClick r:id="rId2"/>
+              </a:rPr>
+              <a:t>unity3d.com/pages/windows/porting</a:t>
+            </a:r>
+            <a:endParaRPr lang="en-AU" sz="4000" dirty="0" smtClean="0"/>
+          </a:p>
+          <a:p>
+            <a:pPr marL="0" indent="0">
+              <a:buNone/>
+            </a:pPr>
+            <a:r>
+              <a:rPr lang="en-AU" sz="4000" dirty="0">
+                <a:hlinkClick r:id="rId3"/>
+              </a:rPr>
+              <a:t>http://</a:t>
+            </a:r>
+            <a:r>
+              <a:rPr lang="en-AU" sz="4000" dirty="0" smtClean="0">
+                <a:hlinkClick r:id="rId3"/>
+              </a:rPr>
+              <a:t>bit.ly/missingwinrttypes</a:t>
+            </a:r>
+            <a:endParaRPr lang="en-AU" sz="4000" dirty="0" smtClean="0"/>
+          </a:p>
+          <a:p>
+            <a:pPr marL="0" indent="0">
+              <a:buNone/>
+            </a:pPr>
+            <a:endParaRPr lang="en-AU" sz="4000" dirty="0"/>
           </a:p>
         </p:txBody>
       </p:sp>
@@ -4527,7 +4560,9 @@
         </p:nvSpPr>
         <p:spPr/>
         <p:txBody>
-          <a:bodyPr/>
+          <a:bodyPr>
+            <a:normAutofit lnSpcReduction="10000"/>
+          </a:bodyPr>
           <a:lstStyle/>
           <a:p>
             <a:r>
@@ -4623,8 +4658,27 @@
             <a:pPr lvl="1"/>
             <a:r>
               <a:rPr lang="en-AU" dirty="0" smtClean="0"/>
-              <a:t>Same as Reflection</a:t>
-            </a:r>
+              <a:t>Same as </a:t>
+            </a:r>
+            <a:r>
+              <a:rPr lang="en-AU" dirty="0" smtClean="0"/>
+              <a:t>Reflection</a:t>
+            </a:r>
+          </a:p>
+          <a:p>
+            <a:r>
+              <a:rPr lang="en-AU" dirty="0">
+                <a:hlinkClick r:id="rId2"/>
+              </a:rPr>
+              <a:t>http://</a:t>
+            </a:r>
+            <a:r>
+              <a:rPr lang="en-AU" dirty="0" smtClean="0">
+                <a:hlinkClick r:id="rId2"/>
+              </a:rPr>
+              <a:t>bit.ly/missingwinrttypes</a:t>
+            </a:r>
+            <a:endParaRPr lang="en-AU" dirty="0" smtClean="0"/>
           </a:p>
         </p:txBody>
       </p:sp>

</xml_diff>

<commit_message>
Extra formatting and changes Added msdeveloper token link
</commit_message>
<xml_diff>
--- a/PortingUnity_Win8.pptx
+++ b/PortingUnity_Win8.pptx
@@ -9,8 +9,8 @@
     <p:sldId id="258" r:id="rId3"/>
     <p:sldId id="257" r:id="rId4"/>
     <p:sldId id="260" r:id="rId5"/>
-    <p:sldId id="269" r:id="rId6"/>
-    <p:sldId id="268" r:id="rId7"/>
+    <p:sldId id="268" r:id="rId6"/>
+    <p:sldId id="269" r:id="rId7"/>
     <p:sldId id="265" r:id="rId8"/>
     <p:sldId id="259" r:id="rId9"/>
     <p:sldId id="262" r:id="rId10"/>
@@ -296,7 +296,7 @@
           <a:p>
             <a:fld id="{EB741852-085B-4304-A0BB-F6C62D9D1BEF}" type="datetimeFigureOut">
               <a:rPr lang="en-AU" smtClean="0"/>
-              <a:t>5/05/2014</a:t>
+              <a:t>17/05/2014</a:t>
             </a:fld>
             <a:endParaRPr lang="en-AU"/>
           </a:p>
@@ -466,7 +466,7 @@
           <a:p>
             <a:fld id="{EB741852-085B-4304-A0BB-F6C62D9D1BEF}" type="datetimeFigureOut">
               <a:rPr lang="en-AU" smtClean="0"/>
-              <a:t>5/05/2014</a:t>
+              <a:t>17/05/2014</a:t>
             </a:fld>
             <a:endParaRPr lang="en-AU"/>
           </a:p>
@@ -646,7 +646,7 @@
           <a:p>
             <a:fld id="{EB741852-085B-4304-A0BB-F6C62D9D1BEF}" type="datetimeFigureOut">
               <a:rPr lang="en-AU" smtClean="0"/>
-              <a:t>5/05/2014</a:t>
+              <a:t>17/05/2014</a:t>
             </a:fld>
             <a:endParaRPr lang="en-AU"/>
           </a:p>
@@ -816,7 +816,7 @@
           <a:p>
             <a:fld id="{EB741852-085B-4304-A0BB-F6C62D9D1BEF}" type="datetimeFigureOut">
               <a:rPr lang="en-AU" smtClean="0"/>
-              <a:t>5/05/2014</a:t>
+              <a:t>17/05/2014</a:t>
             </a:fld>
             <a:endParaRPr lang="en-AU"/>
           </a:p>
@@ -1062,7 +1062,7 @@
           <a:p>
             <a:fld id="{EB741852-085B-4304-A0BB-F6C62D9D1BEF}" type="datetimeFigureOut">
               <a:rPr lang="en-AU" smtClean="0"/>
-              <a:t>5/05/2014</a:t>
+              <a:t>17/05/2014</a:t>
             </a:fld>
             <a:endParaRPr lang="en-AU"/>
           </a:p>
@@ -1294,7 +1294,7 @@
           <a:p>
             <a:fld id="{EB741852-085B-4304-A0BB-F6C62D9D1BEF}" type="datetimeFigureOut">
               <a:rPr lang="en-AU" smtClean="0"/>
-              <a:t>5/05/2014</a:t>
+              <a:t>17/05/2014</a:t>
             </a:fld>
             <a:endParaRPr lang="en-AU"/>
           </a:p>
@@ -1661,7 +1661,7 @@
           <a:p>
             <a:fld id="{EB741852-085B-4304-A0BB-F6C62D9D1BEF}" type="datetimeFigureOut">
               <a:rPr lang="en-AU" smtClean="0"/>
-              <a:t>5/05/2014</a:t>
+              <a:t>17/05/2014</a:t>
             </a:fld>
             <a:endParaRPr lang="en-AU"/>
           </a:p>
@@ -1779,7 +1779,7 @@
           <a:p>
             <a:fld id="{EB741852-085B-4304-A0BB-F6C62D9D1BEF}" type="datetimeFigureOut">
               <a:rPr lang="en-AU" smtClean="0"/>
-              <a:t>5/05/2014</a:t>
+              <a:t>17/05/2014</a:t>
             </a:fld>
             <a:endParaRPr lang="en-AU"/>
           </a:p>
@@ -1874,7 +1874,7 @@
           <a:p>
             <a:fld id="{EB741852-085B-4304-A0BB-F6C62D9D1BEF}" type="datetimeFigureOut">
               <a:rPr lang="en-AU" smtClean="0"/>
-              <a:t>5/05/2014</a:t>
+              <a:t>17/05/2014</a:t>
             </a:fld>
             <a:endParaRPr lang="en-AU"/>
           </a:p>
@@ -2151,7 +2151,7 @@
           <a:p>
             <a:fld id="{EB741852-085B-4304-A0BB-F6C62D9D1BEF}" type="datetimeFigureOut">
               <a:rPr lang="en-AU" smtClean="0"/>
-              <a:t>5/05/2014</a:t>
+              <a:t>17/05/2014</a:t>
             </a:fld>
             <a:endParaRPr lang="en-AU"/>
           </a:p>
@@ -2404,7 +2404,7 @@
           <a:p>
             <a:fld id="{EB741852-085B-4304-A0BB-F6C62D9D1BEF}" type="datetimeFigureOut">
               <a:rPr lang="en-AU" smtClean="0"/>
-              <a:t>5/05/2014</a:t>
+              <a:t>17/05/2014</a:t>
             </a:fld>
             <a:endParaRPr lang="en-AU"/>
           </a:p>
@@ -2617,7 +2617,7 @@
           <a:p>
             <a:fld id="{EB741852-085B-4304-A0BB-F6C62D9D1BEF}" type="datetimeFigureOut">
               <a:rPr lang="en-AU" smtClean="0"/>
-              <a:t>5/05/2014</a:t>
+              <a:t>17/05/2014</a:t>
             </a:fld>
             <a:endParaRPr lang="en-AU"/>
           </a:p>
@@ -3697,6 +3697,10 @@
           <a:bodyPr/>
           <a:lstStyle/>
           <a:p>
+            <a:r>
+              <a:rPr lang="en-AU" smtClean="0"/>
+              <a:t>Useful Links</a:t>
+            </a:r>
             <a:endParaRPr lang="en-AU" dirty="0"/>
           </a:p>
         </p:txBody>
@@ -3722,17 +3726,38 @@
               <a:buNone/>
             </a:pPr>
             <a:r>
-              <a:rPr lang="en-AU" sz="4000" dirty="0">
-                <a:hlinkClick r:id="rId2"/>
-              </a:rPr>
-              <a:t>http://</a:t>
-            </a:r>
-            <a:r>
-              <a:rPr lang="en-AU" sz="4000" dirty="0" smtClean="0">
-                <a:hlinkClick r:id="rId2"/>
-              </a:rPr>
+              <a:rPr lang="en-AU" sz="4000" dirty="0" smtClean="0"/>
+              <a:t>Porting Guides</a:t>
+            </a:r>
+            <a:endParaRPr lang="en-AU" sz="4000" dirty="0" smtClean="0">
+              <a:hlinkClick r:id="rId2"/>
+            </a:endParaRPr>
+          </a:p>
+          <a:p>
+            <a:pPr marL="0" indent="0">
+              <a:buNone/>
+            </a:pPr>
+            <a:r>
+              <a:rPr lang="en-AU" sz="4000" dirty="0" smtClean="0"/>
+              <a:t>	http</a:t>
+            </a:r>
+            <a:r>
+              <a:rPr lang="en-AU" sz="4000" dirty="0"/>
+              <a:t>://</a:t>
+            </a:r>
+            <a:r>
+              <a:rPr lang="en-AU" sz="4000" dirty="0" smtClean="0"/>
               <a:t>unity3d.com/pages/windows/porting</a:t>
             </a:r>
+          </a:p>
+          <a:p>
+            <a:pPr marL="0" indent="0">
+              <a:buNone/>
+            </a:pPr>
+            <a:r>
+              <a:rPr lang="en-AU" sz="4000" dirty="0" smtClean="0"/>
+              <a:t>List of Missing Types</a:t>
+            </a:r>
             <a:endParaRPr lang="en-AU" sz="4000" dirty="0" smtClean="0"/>
           </a:p>
           <a:p>
@@ -3740,16 +3765,38 @@
               <a:buNone/>
             </a:pPr>
             <a:r>
-              <a:rPr lang="en-AU" sz="4000" dirty="0">
-                <a:hlinkClick r:id="rId3"/>
-              </a:rPr>
-              <a:t>http://</a:t>
-            </a:r>
-            <a:r>
-              <a:rPr lang="en-AU" sz="4000" dirty="0" smtClean="0">
-                <a:hlinkClick r:id="rId3"/>
-              </a:rPr>
+              <a:rPr lang="en-AU" sz="4000" dirty="0" smtClean="0"/>
+              <a:t>	http</a:t>
+            </a:r>
+            <a:r>
+              <a:rPr lang="en-AU" sz="4000" dirty="0"/>
+              <a:t>://</a:t>
+            </a:r>
+            <a:r>
+              <a:rPr lang="en-AU" sz="4000" dirty="0" smtClean="0"/>
               <a:t>bit.ly/missingwinrttypes</a:t>
+            </a:r>
+          </a:p>
+          <a:p>
+            <a:pPr marL="0" indent="0">
+              <a:buNone/>
+            </a:pPr>
+            <a:r>
+              <a:rPr lang="en-AU" sz="4000" dirty="0" smtClean="0"/>
+              <a:t>Store Tokens</a:t>
+            </a:r>
+          </a:p>
+          <a:p>
+            <a:pPr marL="0" indent="0">
+              <a:buNone/>
+            </a:pPr>
+            <a:r>
+              <a:rPr lang="en-AU" sz="4000" dirty="0"/>
+              <a:t>	</a:t>
+            </a:r>
+            <a:r>
+              <a:rPr lang="en-AU" sz="4000" dirty="0" smtClean="0"/>
+              <a:t>w8.msdeveloper.com.au</a:t>
             </a:r>
             <a:endParaRPr lang="en-AU" sz="4000" dirty="0" smtClean="0"/>
           </a:p>
@@ -4233,6 +4280,132 @@
 </file>
 
 <file path=ppt/slides/slide5.xml><?xml version="1.0" encoding="utf-8"?>
+<p:sld xmlns:a="http://schemas.openxmlformats.org/drawingml/2006/main" xmlns:r="http://schemas.openxmlformats.org/officeDocument/2006/relationships" xmlns:p="http://schemas.openxmlformats.org/presentationml/2006/main">
+  <p:cSld>
+    <p:spTree>
+      <p:nvGrpSpPr>
+        <p:cNvPr id="1" name=""/>
+        <p:cNvGrpSpPr/>
+        <p:nvPr/>
+      </p:nvGrpSpPr>
+      <p:grpSpPr>
+        <a:xfrm>
+          <a:off x="0" y="0"/>
+          <a:ext cx="0" cy="0"/>
+          <a:chOff x="0" y="0"/>
+          <a:chExt cx="0" cy="0"/>
+        </a:xfrm>
+      </p:grpSpPr>
+      <p:sp>
+        <p:nvSpPr>
+          <p:cNvPr id="2" name="Title 1"/>
+          <p:cNvSpPr>
+            <a:spLocks noGrp="1"/>
+          </p:cNvSpPr>
+          <p:nvPr>
+            <p:ph type="title"/>
+          </p:nvPr>
+        </p:nvSpPr>
+        <p:spPr/>
+        <p:txBody>
+          <a:bodyPr/>
+          <a:lstStyle/>
+          <a:p>
+            <a:r>
+              <a:rPr lang="en-AU" dirty="0" smtClean="0"/>
+              <a:t>Platform Macros</a:t>
+            </a:r>
+            <a:endParaRPr lang="en-AU" dirty="0"/>
+          </a:p>
+        </p:txBody>
+      </p:sp>
+      <p:sp>
+        <p:nvSpPr>
+          <p:cNvPr id="3" name="Content Placeholder 2"/>
+          <p:cNvSpPr>
+            <a:spLocks noGrp="1"/>
+          </p:cNvSpPr>
+          <p:nvPr>
+            <p:ph idx="1"/>
+          </p:nvPr>
+        </p:nvSpPr>
+        <p:spPr/>
+        <p:txBody>
+          <a:bodyPr/>
+          <a:lstStyle/>
+          <a:p>
+            <a:r>
+              <a:rPr lang="en-AU" dirty="0" smtClean="0"/>
+              <a:t>Unity 4.3.4</a:t>
+            </a:r>
+          </a:p>
+          <a:p>
+            <a:pPr lvl="1"/>
+            <a:r>
+              <a:rPr lang="en-AU" dirty="0" smtClean="0"/>
+              <a:t>UNITY_METRO</a:t>
+            </a:r>
+          </a:p>
+          <a:p>
+            <a:pPr lvl="1"/>
+            <a:r>
+              <a:rPr lang="en-AU" dirty="0" smtClean="0"/>
+              <a:t>UNITY_WP8</a:t>
+            </a:r>
+          </a:p>
+          <a:p>
+            <a:pPr lvl="1"/>
+            <a:r>
+              <a:rPr lang="en-AU" dirty="0" smtClean="0"/>
+              <a:t>UNITY_WINRT = (UNITY_METRO || UNITY_WP8)</a:t>
+            </a:r>
+          </a:p>
+          <a:p>
+            <a:pPr lvl="1"/>
+            <a:r>
+              <a:rPr lang="en-AU" dirty="0" smtClean="0"/>
+              <a:t>UNITY_EDITOR</a:t>
+            </a:r>
+          </a:p>
+          <a:p>
+            <a:endParaRPr lang="en-AU" dirty="0"/>
+          </a:p>
+          <a:p>
+            <a:r>
+              <a:rPr lang="en-AU" dirty="0" smtClean="0"/>
+              <a:t>Plugins\Metro</a:t>
+            </a:r>
+          </a:p>
+          <a:p>
+            <a:r>
+              <a:rPr lang="en-AU" dirty="0" smtClean="0"/>
+              <a:t>Plugins\WP8</a:t>
+            </a:r>
+            <a:endParaRPr lang="en-AU" dirty="0"/>
+          </a:p>
+        </p:txBody>
+      </p:sp>
+    </p:spTree>
+    <p:extLst>
+      <p:ext uri="{BB962C8B-B14F-4D97-AF65-F5344CB8AC3E}">
+        <p14:creationId xmlns:p14="http://schemas.microsoft.com/office/powerpoint/2010/main" val="856175786"/>
+      </p:ext>
+    </p:extLst>
+  </p:cSld>
+  <p:clrMapOvr>
+    <a:masterClrMapping/>
+  </p:clrMapOvr>
+  <p:timing>
+    <p:tnLst>
+      <p:par>
+        <p:cTn id="1" dur="indefinite" restart="never" nodeType="tmRoot"/>
+      </p:par>
+    </p:tnLst>
+  </p:timing>
+</p:sld>
+</file>
+
+<file path=ppt/slides/slide6.xml><?xml version="1.0" encoding="utf-8"?>
 <p:sld xmlns:a="http://schemas.openxmlformats.org/drawingml/2006/main" xmlns:r="http://schemas.openxmlformats.org/officeDocument/2006/relationships" xmlns:p="http://schemas.openxmlformats.org/presentationml/2006/main">
   <p:cSld>
     <p:spTree>
@@ -4397,117 +4570,6 @@
 </p:sld>
 </file>
 
-<file path=ppt/slides/slide6.xml><?xml version="1.0" encoding="utf-8"?>
-<p:sld xmlns:a="http://schemas.openxmlformats.org/drawingml/2006/main" xmlns:r="http://schemas.openxmlformats.org/officeDocument/2006/relationships" xmlns:p="http://schemas.openxmlformats.org/presentationml/2006/main">
-  <p:cSld>
-    <p:spTree>
-      <p:nvGrpSpPr>
-        <p:cNvPr id="1" name=""/>
-        <p:cNvGrpSpPr/>
-        <p:nvPr/>
-      </p:nvGrpSpPr>
-      <p:grpSpPr>
-        <a:xfrm>
-          <a:off x="0" y="0"/>
-          <a:ext cx="0" cy="0"/>
-          <a:chOff x="0" y="0"/>
-          <a:chExt cx="0" cy="0"/>
-        </a:xfrm>
-      </p:grpSpPr>
-      <p:sp>
-        <p:nvSpPr>
-          <p:cNvPr id="2" name="Title 1"/>
-          <p:cNvSpPr>
-            <a:spLocks noGrp="1"/>
-          </p:cNvSpPr>
-          <p:nvPr>
-            <p:ph type="title"/>
-          </p:nvPr>
-        </p:nvSpPr>
-        <p:spPr/>
-        <p:txBody>
-          <a:bodyPr/>
-          <a:lstStyle/>
-          <a:p>
-            <a:r>
-              <a:rPr lang="en-AU" dirty="0" smtClean="0"/>
-              <a:t>Platform Macros</a:t>
-            </a:r>
-            <a:endParaRPr lang="en-AU" dirty="0"/>
-          </a:p>
-        </p:txBody>
-      </p:sp>
-      <p:sp>
-        <p:nvSpPr>
-          <p:cNvPr id="3" name="Content Placeholder 2"/>
-          <p:cNvSpPr>
-            <a:spLocks noGrp="1"/>
-          </p:cNvSpPr>
-          <p:nvPr>
-            <p:ph idx="1"/>
-          </p:nvPr>
-        </p:nvSpPr>
-        <p:spPr/>
-        <p:txBody>
-          <a:bodyPr/>
-          <a:lstStyle/>
-          <a:p>
-            <a:r>
-              <a:rPr lang="en-AU" dirty="0" smtClean="0"/>
-              <a:t>Unity 4.3.4</a:t>
-            </a:r>
-          </a:p>
-          <a:p>
-            <a:pPr lvl="1"/>
-            <a:r>
-              <a:rPr lang="en-AU" dirty="0" smtClean="0"/>
-              <a:t>UNITY_METRO</a:t>
-            </a:r>
-          </a:p>
-          <a:p>
-            <a:pPr lvl="1"/>
-            <a:r>
-              <a:rPr lang="en-AU" dirty="0" smtClean="0"/>
-              <a:t>UNITY_WP8</a:t>
-            </a:r>
-          </a:p>
-          <a:p>
-            <a:pPr lvl="1"/>
-            <a:r>
-              <a:rPr lang="en-AU" dirty="0" smtClean="0"/>
-              <a:t>UNITY_WINRT = (UNITY_METRO || UNITY_WP8)</a:t>
-            </a:r>
-          </a:p>
-          <a:p>
-            <a:pPr lvl="1"/>
-            <a:r>
-              <a:rPr lang="en-AU" dirty="0" smtClean="0"/>
-              <a:t>UNITY_EDITOR</a:t>
-            </a:r>
-            <a:endParaRPr lang="en-AU" dirty="0"/>
-          </a:p>
-        </p:txBody>
-      </p:sp>
-    </p:spTree>
-    <p:extLst>
-      <p:ext uri="{BB962C8B-B14F-4D97-AF65-F5344CB8AC3E}">
-        <p14:creationId xmlns:p14="http://schemas.microsoft.com/office/powerpoint/2010/main" val="856175786"/>
-      </p:ext>
-    </p:extLst>
-  </p:cSld>
-  <p:clrMapOvr>
-    <a:masterClrMapping/>
-  </p:clrMapOvr>
-  <p:timing>
-    <p:tnLst>
-      <p:par>
-        <p:cTn id="1" dur="indefinite" restart="never" nodeType="tmRoot"/>
-      </p:par>
-    </p:tnLst>
-  </p:timing>
-</p:sld>
-</file>
-
 <file path=ppt/slides/slide7.xml><?xml version="1.0" encoding="utf-8"?>
 <p:sld xmlns:a="http://schemas.openxmlformats.org/drawingml/2006/main" xmlns:r="http://schemas.openxmlformats.org/officeDocument/2006/relationships" xmlns:p="http://schemas.openxmlformats.org/presentationml/2006/main">
   <p:cSld>
@@ -4658,11 +4720,7 @@
             <a:pPr lvl="1"/>
             <a:r>
               <a:rPr lang="en-AU" dirty="0" smtClean="0"/>
-              <a:t>Same as </a:t>
-            </a:r>
-            <a:r>
-              <a:rPr lang="en-AU" dirty="0" smtClean="0"/>
-              <a:t>Reflection</a:t>
+              <a:t>Same as Reflection</a:t>
             </a:r>
           </a:p>
           <a:p>

</xml_diff>